<commit_message>
Added presentation for Part 2 - Technology & Patterns
</commit_message>
<xml_diff>
--- a/Presentation-Part1-Fundamentals-And-Essentials.pptx
+++ b/Presentation-Part1-Fundamentals-And-Essentials.pptx
@@ -265,7 +265,7 @@
           <a:p>
             <a:fld id="{0F9C471C-5CEB-41C5-B26F-30EBC0FE28CB}" type="datetimeFigureOut">
               <a:rPr lang="en-US" smtClean="0"/>
-              <a:t>1/12/2022</a:t>
+              <a:t>1/19/2022</a:t>
             </a:fld>
             <a:endParaRPr lang="en-US"/>
           </a:p>
@@ -5078,7 +5078,7 @@
           <a:p>
             <a:fld id="{F34B6E3E-06F4-4326-ABDB-61EE022A2F5F}" type="datetimeFigureOut">
               <a:rPr lang="en-US" smtClean="0"/>
-              <a:t>1/12/2022</a:t>
+              <a:t>1/19/2022</a:t>
             </a:fld>
             <a:endParaRPr lang="en-US"/>
           </a:p>
@@ -5345,7 +5345,7 @@
           <a:p>
             <a:fld id="{F34B6E3E-06F4-4326-ABDB-61EE022A2F5F}" type="datetimeFigureOut">
               <a:rPr lang="en-US" smtClean="0"/>
-              <a:t>1/12/2022</a:t>
+              <a:t>1/19/2022</a:t>
             </a:fld>
             <a:endParaRPr lang="en-US"/>
           </a:p>
@@ -5541,7 +5541,7 @@
           <a:p>
             <a:fld id="{F34B6E3E-06F4-4326-ABDB-61EE022A2F5F}" type="datetimeFigureOut">
               <a:rPr lang="en-US" smtClean="0"/>
-              <a:t>1/12/2022</a:t>
+              <a:t>1/19/2022</a:t>
             </a:fld>
             <a:endParaRPr lang="en-US"/>
           </a:p>
@@ -5804,7 +5804,7 @@
           <a:p>
             <a:fld id="{F34B6E3E-06F4-4326-ABDB-61EE022A2F5F}" type="datetimeFigureOut">
               <a:rPr lang="en-US" smtClean="0"/>
-              <a:t>1/12/2022</a:t>
+              <a:t>1/19/2022</a:t>
             </a:fld>
             <a:endParaRPr lang="en-US"/>
           </a:p>
@@ -6238,7 +6238,7 @@
           <a:p>
             <a:fld id="{F34B6E3E-06F4-4326-ABDB-61EE022A2F5F}" type="datetimeFigureOut">
               <a:rPr lang="en-US" smtClean="0"/>
-              <a:t>1/12/2022</a:t>
+              <a:t>1/19/2022</a:t>
             </a:fld>
             <a:endParaRPr lang="en-US"/>
           </a:p>
@@ -6784,7 +6784,7 @@
           <a:p>
             <a:fld id="{F34B6E3E-06F4-4326-ABDB-61EE022A2F5F}" type="datetimeFigureOut">
               <a:rPr lang="en-US" smtClean="0"/>
-              <a:t>1/12/2022</a:t>
+              <a:t>1/19/2022</a:t>
             </a:fld>
             <a:endParaRPr lang="en-US"/>
           </a:p>
@@ -7504,7 +7504,7 @@
           <a:p>
             <a:fld id="{F34B6E3E-06F4-4326-ABDB-61EE022A2F5F}" type="datetimeFigureOut">
               <a:rPr lang="en-US" smtClean="0"/>
-              <a:t>1/12/2022</a:t>
+              <a:t>1/19/2022</a:t>
             </a:fld>
             <a:endParaRPr lang="en-US"/>
           </a:p>
@@ -7674,7 +7674,7 @@
           <a:p>
             <a:fld id="{F34B6E3E-06F4-4326-ABDB-61EE022A2F5F}" type="datetimeFigureOut">
               <a:rPr lang="en-US" smtClean="0"/>
-              <a:t>1/12/2022</a:t>
+              <a:t>1/19/2022</a:t>
             </a:fld>
             <a:endParaRPr lang="en-US"/>
           </a:p>
@@ -7854,7 +7854,7 @@
           <a:p>
             <a:fld id="{F34B6E3E-06F4-4326-ABDB-61EE022A2F5F}" type="datetimeFigureOut">
               <a:rPr lang="en-US" smtClean="0"/>
-              <a:t>1/12/2022</a:t>
+              <a:t>1/19/2022</a:t>
             </a:fld>
             <a:endParaRPr lang="en-US"/>
           </a:p>
@@ -8522,7 +8522,7 @@
           <a:p>
             <a:fld id="{F34B6E3E-06F4-4326-ABDB-61EE022A2F5F}" type="datetimeFigureOut">
               <a:rPr lang="en-US" smtClean="0"/>
-              <a:t>1/12/2022</a:t>
+              <a:t>1/19/2022</a:t>
             </a:fld>
             <a:endParaRPr lang="en-US"/>
           </a:p>
@@ -8772,7 +8772,7 @@
           <a:p>
             <a:fld id="{F34B6E3E-06F4-4326-ABDB-61EE022A2F5F}" type="datetimeFigureOut">
               <a:rPr lang="en-US" smtClean="0"/>
-              <a:t>1/12/2022</a:t>
+              <a:t>1/19/2022</a:t>
             </a:fld>
             <a:endParaRPr lang="en-US"/>
           </a:p>
@@ -9004,7 +9004,7 @@
           <a:p>
             <a:fld id="{F34B6E3E-06F4-4326-ABDB-61EE022A2F5F}" type="datetimeFigureOut">
               <a:rPr lang="en-US" smtClean="0"/>
-              <a:t>1/12/2022</a:t>
+              <a:t>1/19/2022</a:t>
             </a:fld>
             <a:endParaRPr lang="en-US"/>
           </a:p>
@@ -9385,7 +9385,7 @@
           <a:p>
             <a:fld id="{F34B6E3E-06F4-4326-ABDB-61EE022A2F5F}" type="datetimeFigureOut">
               <a:rPr lang="en-US" smtClean="0"/>
-              <a:t>1/12/2022</a:t>
+              <a:t>1/19/2022</a:t>
             </a:fld>
             <a:endParaRPr lang="en-US"/>
           </a:p>
@@ -9503,7 +9503,7 @@
           <a:p>
             <a:fld id="{F34B6E3E-06F4-4326-ABDB-61EE022A2F5F}" type="datetimeFigureOut">
               <a:rPr lang="en-US" smtClean="0"/>
-              <a:t>1/12/2022</a:t>
+              <a:t>1/19/2022</a:t>
             </a:fld>
             <a:endParaRPr lang="en-US"/>
           </a:p>
@@ -9598,7 +9598,7 @@
           <a:p>
             <a:fld id="{F34B6E3E-06F4-4326-ABDB-61EE022A2F5F}" type="datetimeFigureOut">
               <a:rPr lang="en-US" smtClean="0"/>
-              <a:t>1/12/2022</a:t>
+              <a:t>1/19/2022</a:t>
             </a:fld>
             <a:endParaRPr lang="en-US"/>
           </a:p>
@@ -9847,7 +9847,7 @@
           <a:p>
             <a:fld id="{F34B6E3E-06F4-4326-ABDB-61EE022A2F5F}" type="datetimeFigureOut">
               <a:rPr lang="en-US" smtClean="0"/>
-              <a:t>1/12/2022</a:t>
+              <a:t>1/19/2022</a:t>
             </a:fld>
             <a:endParaRPr lang="en-US"/>
           </a:p>
@@ -10127,7 +10127,7 @@
           <a:p>
             <a:fld id="{F34B6E3E-06F4-4326-ABDB-61EE022A2F5F}" type="datetimeFigureOut">
               <a:rPr lang="en-US" smtClean="0"/>
-              <a:t>1/12/2022</a:t>
+              <a:t>1/19/2022</a:t>
             </a:fld>
             <a:endParaRPr lang="en-US"/>
           </a:p>
@@ -13204,7 +13204,7 @@
           <a:p>
             <a:fld id="{F34B6E3E-06F4-4326-ABDB-61EE022A2F5F}" type="datetimeFigureOut">
               <a:rPr lang="en-US" smtClean="0"/>
-              <a:t>1/12/2022</a:t>
+              <a:t>1/19/2022</a:t>
             </a:fld>
             <a:endParaRPr lang="en-US"/>
           </a:p>
@@ -28954,15 +28954,19 @@
             </a:pPr>
             <a:r>
               <a:rPr lang="en-US" dirty="0"/>
-              <a:t>Docker, CI/CD, </a:t>
-            </a:r>
-            <a:r>
-              <a:rPr lang="en-US" dirty="0" err="1"/>
-              <a:t>Redist</a:t>
-            </a:r>
-            <a:r>
-              <a:rPr lang="en-US" dirty="0"/>
-              <a:t>, Elasticsearch</a:t>
+              <a:t>Docker, CI/CD, Redis</a:t>
+            </a:r>
+            <a:r>
+              <a:rPr lang="bg-BG"/>
+              <a:t>,</a:t>
+            </a:r>
+            <a:r>
+              <a:rPr lang="en-US"/>
+              <a:t> </a:t>
+            </a:r>
+            <a:r>
+              <a:rPr lang="en-US" dirty="0"/>
+              <a:t>Elasticsearch</a:t>
             </a:r>
           </a:p>
           <a:p>

</xml_diff>